<commit_message>
update on roofline blog
</commit_message>
<xml_diff>
--- a/blog/roofline-analysis/diagrams.pptx
+++ b/blog/roofline-analysis/diagrams.pptx
@@ -141,7 +141,7 @@
       </p:grpSpPr>
       <p:sp>
         <p:nvSpPr>
-          <p:cNvPr id="406023808" name="Header Placeholder 1"/>
+          <p:cNvPr id="1052118566" name="Header Placeholder 1"/>
           <p:cNvSpPr>
             <a:spLocks noGrp="1"/>
           </p:cNvSpPr>
@@ -175,7 +175,7 @@
       </p:sp>
       <p:sp>
         <p:nvSpPr>
-          <p:cNvPr id="718336322" name="Date Placeholder 2"/>
+          <p:cNvPr id="812544374" name="Date Placeholder 2"/>
           <p:cNvSpPr>
             <a:spLocks noGrp="1"/>
           </p:cNvSpPr>
@@ -213,7 +213,7 @@
       </p:sp>
       <p:sp>
         <p:nvSpPr>
-          <p:cNvPr id="1089777827" name="Slide Image Placeholder 3"/>
+          <p:cNvPr id="585070165" name="Slide Image Placeholder 3"/>
           <p:cNvSpPr>
             <a:spLocks noChangeAspect="1" noGrp="1" noRot="1"/>
           </p:cNvSpPr>
@@ -249,7 +249,7 @@
       </p:sp>
       <p:sp>
         <p:nvSpPr>
-          <p:cNvPr id="1534027555" name="Notes Placeholder 4"/>
+          <p:cNvPr id="1801594254" name="Notes Placeholder 4"/>
           <p:cNvSpPr>
             <a:spLocks noGrp="1"/>
           </p:cNvSpPr>
@@ -323,7 +323,7 @@
       </p:sp>
       <p:sp>
         <p:nvSpPr>
-          <p:cNvPr id="1701802393" name="Footer Placeholder 5"/>
+          <p:cNvPr id="1274240971" name="Footer Placeholder 5"/>
           <p:cNvSpPr>
             <a:spLocks noGrp="1"/>
           </p:cNvSpPr>
@@ -357,7 +357,7 @@
       </p:sp>
       <p:sp>
         <p:nvSpPr>
-          <p:cNvPr id="1842782835" name="Slide Number Placeholder 6"/>
+          <p:cNvPr id="730548583" name="Slide Number Placeholder 6"/>
           <p:cNvSpPr>
             <a:spLocks noGrp="1"/>
           </p:cNvSpPr>
@@ -510,7 +510,7 @@
       </p:grpSpPr>
       <p:sp>
         <p:nvSpPr>
-          <p:cNvPr id="2003440823" name="Slide Image Placeholder 1"/>
+          <p:cNvPr id="1044634825" name="Slide Image Placeholder 1"/>
           <p:cNvSpPr>
             <a:spLocks noChangeAspect="1" noGrp="1" noRot="1"/>
           </p:cNvSpPr>
@@ -527,7 +527,7 @@
       </p:sp>
       <p:sp>
         <p:nvSpPr>
-          <p:cNvPr id="1337757769" name="Notes Placeholder 2"/>
+          <p:cNvPr id="1975084199" name="Notes Placeholder 2"/>
           <p:cNvSpPr>
             <a:spLocks noGrp="1"/>
           </p:cNvSpPr>
@@ -552,7 +552,7 @@
       </p:sp>
       <p:sp>
         <p:nvSpPr>
-          <p:cNvPr id="857859485" name="Slide Number Placeholder 3"/>
+          <p:cNvPr id="1025190327" name="Slide Number Placeholder 3"/>
           <p:cNvSpPr>
             <a:spLocks noGrp="1"/>
           </p:cNvSpPr>
@@ -1254,7 +1254,7 @@
       </p:grpSpPr>
       <p:sp>
         <p:nvSpPr>
-          <p:cNvPr id="504493026" name="Title 1"/>
+          <p:cNvPr id="694961955" name="Title 1"/>
           <p:cNvSpPr>
             <a:spLocks noGrp="1"/>
           </p:cNvSpPr>
@@ -1289,7 +1289,7 @@
       </p:sp>
       <p:sp>
         <p:nvSpPr>
-          <p:cNvPr id="861456048" name="Subtitle 2"/>
+          <p:cNvPr id="1566118176" name="Subtitle 2"/>
           <p:cNvSpPr>
             <a:spLocks noGrp="1"/>
           </p:cNvSpPr>
@@ -1357,7 +1357,7 @@
       </p:sp>
       <p:sp>
         <p:nvSpPr>
-          <p:cNvPr id="1867332832" name="Date Placeholder 3"/>
+          <p:cNvPr id="1788882196" name="Date Placeholder 3"/>
           <p:cNvSpPr>
             <a:spLocks noGrp="1"/>
           </p:cNvSpPr>
@@ -1383,7 +1383,7 @@
       </p:sp>
       <p:sp>
         <p:nvSpPr>
-          <p:cNvPr id="1525095839" name="Footer Placeholder 4"/>
+          <p:cNvPr id="641210832" name="Footer Placeholder 4"/>
           <p:cNvSpPr>
             <a:spLocks noGrp="1"/>
           </p:cNvSpPr>
@@ -1405,7 +1405,7 @@
       </p:sp>
       <p:sp>
         <p:nvSpPr>
-          <p:cNvPr id="1903429950" name="Slide Number Placeholder 5"/>
+          <p:cNvPr id="1917293259" name="Slide Number Placeholder 5"/>
           <p:cNvSpPr>
             <a:spLocks noGrp="1"/>
           </p:cNvSpPr>
@@ -1456,7 +1456,7 @@
       </p:grpSpPr>
       <p:sp>
         <p:nvSpPr>
-          <p:cNvPr id="82422513" name="Title 1"/>
+          <p:cNvPr id="131320988" name="Title 1"/>
           <p:cNvSpPr>
             <a:spLocks noGrp="1"/>
           </p:cNvSpPr>
@@ -1482,7 +1482,7 @@
       </p:sp>
       <p:sp>
         <p:nvSpPr>
-          <p:cNvPr id="1930596655" name="Vertical Text Placeholder 2"/>
+          <p:cNvPr id="1460901873" name="Vertical Text Placeholder 2"/>
           <p:cNvSpPr>
             <a:spLocks noGrp="1"/>
           </p:cNvSpPr>
@@ -1548,7 +1548,7 @@
       </p:sp>
       <p:sp>
         <p:nvSpPr>
-          <p:cNvPr id="685023351" name="Date Placeholder 3"/>
+          <p:cNvPr id="1466651274" name="Date Placeholder 3"/>
           <p:cNvSpPr>
             <a:spLocks noGrp="1"/>
           </p:cNvSpPr>
@@ -1574,7 +1574,7 @@
       </p:sp>
       <p:sp>
         <p:nvSpPr>
-          <p:cNvPr id="1163512025" name="Footer Placeholder 4"/>
+          <p:cNvPr id="1080064877" name="Footer Placeholder 4"/>
           <p:cNvSpPr>
             <a:spLocks noGrp="1"/>
           </p:cNvSpPr>
@@ -1596,7 +1596,7 @@
       </p:sp>
       <p:sp>
         <p:nvSpPr>
-          <p:cNvPr id="1946171323" name="Slide Number Placeholder 5"/>
+          <p:cNvPr id="1041379457" name="Slide Number Placeholder 5"/>
           <p:cNvSpPr>
             <a:spLocks noGrp="1"/>
           </p:cNvSpPr>
@@ -1647,7 +1647,7 @@
       </p:grpSpPr>
       <p:sp>
         <p:nvSpPr>
-          <p:cNvPr id="1177497786" name="Vertical Title 1"/>
+          <p:cNvPr id="1157709063" name="Vertical Title 1"/>
           <p:cNvSpPr>
             <a:spLocks noGrp="1"/>
           </p:cNvSpPr>
@@ -1678,7 +1678,7 @@
       </p:sp>
       <p:sp>
         <p:nvSpPr>
-          <p:cNvPr id="1292529745" name="Vertical Text Placeholder 2"/>
+          <p:cNvPr id="148988981" name="Vertical Text Placeholder 2"/>
           <p:cNvSpPr>
             <a:spLocks noGrp="1"/>
           </p:cNvSpPr>
@@ -1749,7 +1749,7 @@
       </p:sp>
       <p:sp>
         <p:nvSpPr>
-          <p:cNvPr id="1261335092" name="Date Placeholder 3"/>
+          <p:cNvPr id="1415984750" name="Date Placeholder 3"/>
           <p:cNvSpPr>
             <a:spLocks noGrp="1"/>
           </p:cNvSpPr>
@@ -1775,7 +1775,7 @@
       </p:sp>
       <p:sp>
         <p:nvSpPr>
-          <p:cNvPr id="1883050184" name="Footer Placeholder 4"/>
+          <p:cNvPr id="2030503708" name="Footer Placeholder 4"/>
           <p:cNvSpPr>
             <a:spLocks noGrp="1"/>
           </p:cNvSpPr>
@@ -1797,7 +1797,7 @@
       </p:sp>
       <p:sp>
         <p:nvSpPr>
-          <p:cNvPr id="1164784888" name="Slide Number Placeholder 5"/>
+          <p:cNvPr id="917504885" name="Slide Number Placeholder 5"/>
           <p:cNvSpPr>
             <a:spLocks noGrp="1"/>
           </p:cNvSpPr>
@@ -1848,7 +1848,7 @@
       </p:grpSpPr>
       <p:sp>
         <p:nvSpPr>
-          <p:cNvPr id="749754453" name="Title 1"/>
+          <p:cNvPr id="1213593727" name="Title 1"/>
           <p:cNvSpPr>
             <a:spLocks noGrp="1"/>
           </p:cNvSpPr>
@@ -1874,7 +1874,7 @@
       </p:sp>
       <p:sp>
         <p:nvSpPr>
-          <p:cNvPr id="618380709" name="Content Placeholder 2"/>
+          <p:cNvPr id="545618577" name="Content Placeholder 2"/>
           <p:cNvSpPr>
             <a:spLocks noGrp="1"/>
           </p:cNvSpPr>
@@ -1940,7 +1940,7 @@
       </p:sp>
       <p:sp>
         <p:nvSpPr>
-          <p:cNvPr id="704603549" name="Date Placeholder 3"/>
+          <p:cNvPr id="284772233" name="Date Placeholder 3"/>
           <p:cNvSpPr>
             <a:spLocks noGrp="1"/>
           </p:cNvSpPr>
@@ -1966,7 +1966,7 @@
       </p:sp>
       <p:sp>
         <p:nvSpPr>
-          <p:cNvPr id="1505155549" name="Footer Placeholder 4"/>
+          <p:cNvPr id="736445804" name="Footer Placeholder 4"/>
           <p:cNvSpPr>
             <a:spLocks noGrp="1"/>
           </p:cNvSpPr>
@@ -1988,7 +1988,7 @@
       </p:sp>
       <p:sp>
         <p:nvSpPr>
-          <p:cNvPr id="2022158387" name="Slide Number Placeholder 5"/>
+          <p:cNvPr id="1069301127" name="Slide Number Placeholder 5"/>
           <p:cNvSpPr>
             <a:spLocks noGrp="1"/>
           </p:cNvSpPr>
@@ -2039,7 +2039,7 @@
       </p:grpSpPr>
       <p:sp>
         <p:nvSpPr>
-          <p:cNvPr id="444491850" name="Title 1"/>
+          <p:cNvPr id="1433225140" name="Title 1"/>
           <p:cNvSpPr>
             <a:spLocks noGrp="1"/>
           </p:cNvSpPr>
@@ -2074,7 +2074,7 @@
       </p:sp>
       <p:sp>
         <p:nvSpPr>
-          <p:cNvPr id="402615002" name="Text Placeholder 2"/>
+          <p:cNvPr id="123781650" name="Text Placeholder 2"/>
           <p:cNvSpPr>
             <a:spLocks noGrp="1"/>
           </p:cNvSpPr>
@@ -2196,7 +2196,7 @@
       </p:sp>
       <p:sp>
         <p:nvSpPr>
-          <p:cNvPr id="1361196643" name="Date Placeholder 3"/>
+          <p:cNvPr id="885524110" name="Date Placeholder 3"/>
           <p:cNvSpPr>
             <a:spLocks noGrp="1"/>
           </p:cNvSpPr>
@@ -2222,7 +2222,7 @@
       </p:sp>
       <p:sp>
         <p:nvSpPr>
-          <p:cNvPr id="174937722" name="Footer Placeholder 4"/>
+          <p:cNvPr id="1129196217" name="Footer Placeholder 4"/>
           <p:cNvSpPr>
             <a:spLocks noGrp="1"/>
           </p:cNvSpPr>
@@ -2244,7 +2244,7 @@
       </p:sp>
       <p:sp>
         <p:nvSpPr>
-          <p:cNvPr id="1300492529" name="Slide Number Placeholder 5"/>
+          <p:cNvPr id="2089883275" name="Slide Number Placeholder 5"/>
           <p:cNvSpPr>
             <a:spLocks noGrp="1"/>
           </p:cNvSpPr>
@@ -2295,7 +2295,7 @@
       </p:grpSpPr>
       <p:sp>
         <p:nvSpPr>
-          <p:cNvPr id="1336255130" name="Title 1"/>
+          <p:cNvPr id="1142466546" name="Title 1"/>
           <p:cNvSpPr>
             <a:spLocks noGrp="1"/>
           </p:cNvSpPr>
@@ -2321,7 +2321,7 @@
       </p:sp>
       <p:sp>
         <p:nvSpPr>
-          <p:cNvPr id="426545570" name="Content Placeholder 2"/>
+          <p:cNvPr id="1579398517" name="Content Placeholder 2"/>
           <p:cNvSpPr>
             <a:spLocks noGrp="1"/>
           </p:cNvSpPr>
@@ -2392,7 +2392,7 @@
       </p:sp>
       <p:sp>
         <p:nvSpPr>
-          <p:cNvPr id="1508732352" name="Content Placeholder 3"/>
+          <p:cNvPr id="392133863" name="Content Placeholder 3"/>
           <p:cNvSpPr>
             <a:spLocks noGrp="1"/>
           </p:cNvSpPr>
@@ -2463,7 +2463,7 @@
       </p:sp>
       <p:sp>
         <p:nvSpPr>
-          <p:cNvPr id="1918824650" name="Date Placeholder 4"/>
+          <p:cNvPr id="1208256960" name="Date Placeholder 4"/>
           <p:cNvSpPr>
             <a:spLocks noGrp="1"/>
           </p:cNvSpPr>
@@ -2489,7 +2489,7 @@
       </p:sp>
       <p:sp>
         <p:nvSpPr>
-          <p:cNvPr id="530808813" name="Footer Placeholder 5"/>
+          <p:cNvPr id="1546288247" name="Footer Placeholder 5"/>
           <p:cNvSpPr>
             <a:spLocks noGrp="1"/>
           </p:cNvSpPr>
@@ -2511,7 +2511,7 @@
       </p:sp>
       <p:sp>
         <p:nvSpPr>
-          <p:cNvPr id="1294482332" name="Slide Number Placeholder 6"/>
+          <p:cNvPr id="1902503384" name="Slide Number Placeholder 6"/>
           <p:cNvSpPr>
             <a:spLocks noGrp="1"/>
           </p:cNvSpPr>
@@ -2562,7 +2562,7 @@
       </p:grpSpPr>
       <p:sp>
         <p:nvSpPr>
-          <p:cNvPr id="322706607" name="Title 1"/>
+          <p:cNvPr id="1320508316" name="Title 1"/>
           <p:cNvSpPr>
             <a:spLocks noGrp="1"/>
           </p:cNvSpPr>
@@ -2593,7 +2593,7 @@
       </p:sp>
       <p:sp>
         <p:nvSpPr>
-          <p:cNvPr id="1127139305" name="Text Placeholder 2"/>
+          <p:cNvPr id="595086162" name="Text Placeholder 2"/>
           <p:cNvSpPr>
             <a:spLocks noGrp="1"/>
           </p:cNvSpPr>
@@ -2661,7 +2661,7 @@
       </p:sp>
       <p:sp>
         <p:nvSpPr>
-          <p:cNvPr id="68787697" name="Content Placeholder 3"/>
+          <p:cNvPr id="648512444" name="Content Placeholder 3"/>
           <p:cNvSpPr>
             <a:spLocks noGrp="1"/>
           </p:cNvSpPr>
@@ -2732,7 +2732,7 @@
       </p:sp>
       <p:sp>
         <p:nvSpPr>
-          <p:cNvPr id="1361852728" name="Text Placeholder 4"/>
+          <p:cNvPr id="2089081372" name="Text Placeholder 4"/>
           <p:cNvSpPr>
             <a:spLocks noGrp="1"/>
           </p:cNvSpPr>
@@ -2800,7 +2800,7 @@
       </p:sp>
       <p:sp>
         <p:nvSpPr>
-          <p:cNvPr id="1975810353" name="Content Placeholder 5"/>
+          <p:cNvPr id="386283642" name="Content Placeholder 5"/>
           <p:cNvSpPr>
             <a:spLocks noGrp="1"/>
           </p:cNvSpPr>
@@ -2871,7 +2871,7 @@
       </p:sp>
       <p:sp>
         <p:nvSpPr>
-          <p:cNvPr id="792348396" name="Date Placeholder 6"/>
+          <p:cNvPr id="2085932590" name="Date Placeholder 6"/>
           <p:cNvSpPr>
             <a:spLocks noGrp="1"/>
           </p:cNvSpPr>
@@ -2897,7 +2897,7 @@
       </p:sp>
       <p:sp>
         <p:nvSpPr>
-          <p:cNvPr id="1818371093" name="Footer Placeholder 7"/>
+          <p:cNvPr id="995936069" name="Footer Placeholder 7"/>
           <p:cNvSpPr>
             <a:spLocks noGrp="1"/>
           </p:cNvSpPr>
@@ -2919,7 +2919,7 @@
       </p:sp>
       <p:sp>
         <p:nvSpPr>
-          <p:cNvPr id="616982724" name="Slide Number Placeholder 8"/>
+          <p:cNvPr id="1322461722" name="Slide Number Placeholder 8"/>
           <p:cNvSpPr>
             <a:spLocks noGrp="1"/>
           </p:cNvSpPr>
@@ -2970,7 +2970,7 @@
       </p:grpSpPr>
       <p:sp>
         <p:nvSpPr>
-          <p:cNvPr id="248595157" name="Title 1"/>
+          <p:cNvPr id="1597835340" name="Title 1"/>
           <p:cNvSpPr>
             <a:spLocks noGrp="1"/>
           </p:cNvSpPr>
@@ -2996,7 +2996,7 @@
       </p:sp>
       <p:sp>
         <p:nvSpPr>
-          <p:cNvPr id="1885595557" name="Date Placeholder 2"/>
+          <p:cNvPr id="215313332" name="Date Placeholder 2"/>
           <p:cNvSpPr>
             <a:spLocks noGrp="1"/>
           </p:cNvSpPr>
@@ -3022,7 +3022,7 @@
       </p:sp>
       <p:sp>
         <p:nvSpPr>
-          <p:cNvPr id="670373926" name="Footer Placeholder 3"/>
+          <p:cNvPr id="1876697780" name="Footer Placeholder 3"/>
           <p:cNvSpPr>
             <a:spLocks noGrp="1"/>
           </p:cNvSpPr>
@@ -3044,7 +3044,7 @@
       </p:sp>
       <p:sp>
         <p:nvSpPr>
-          <p:cNvPr id="311829793" name="Slide Number Placeholder 4"/>
+          <p:cNvPr id="681273310" name="Slide Number Placeholder 4"/>
           <p:cNvSpPr>
             <a:spLocks noGrp="1"/>
           </p:cNvSpPr>
@@ -3095,7 +3095,7 @@
       </p:grpSpPr>
       <p:sp>
         <p:nvSpPr>
-          <p:cNvPr id="867665378" name="Date Placeholder 1"/>
+          <p:cNvPr id="1401230222" name="Date Placeholder 1"/>
           <p:cNvSpPr>
             <a:spLocks noGrp="1"/>
           </p:cNvSpPr>
@@ -3121,7 +3121,7 @@
       </p:sp>
       <p:sp>
         <p:nvSpPr>
-          <p:cNvPr id="104339329" name="Footer Placeholder 2"/>
+          <p:cNvPr id="1693155301" name="Footer Placeholder 2"/>
           <p:cNvSpPr>
             <a:spLocks noGrp="1"/>
           </p:cNvSpPr>
@@ -3143,7 +3143,7 @@
       </p:sp>
       <p:sp>
         <p:nvSpPr>
-          <p:cNvPr id="170073629" name="Slide Number Placeholder 3"/>
+          <p:cNvPr id="856548261" name="Slide Number Placeholder 3"/>
           <p:cNvSpPr>
             <a:spLocks noGrp="1"/>
           </p:cNvSpPr>
@@ -3194,7 +3194,7 @@
       </p:grpSpPr>
       <p:sp>
         <p:nvSpPr>
-          <p:cNvPr id="721696269" name="Title 1"/>
+          <p:cNvPr id="405864218" name="Title 1"/>
           <p:cNvSpPr>
             <a:spLocks noGrp="1"/>
           </p:cNvSpPr>
@@ -3229,7 +3229,7 @@
       </p:sp>
       <p:sp>
         <p:nvSpPr>
-          <p:cNvPr id="2071040634" name="Content Placeholder 2"/>
+          <p:cNvPr id="611128505" name="Content Placeholder 2"/>
           <p:cNvSpPr>
             <a:spLocks noGrp="1"/>
           </p:cNvSpPr>
@@ -3328,7 +3328,7 @@
       </p:sp>
       <p:sp>
         <p:nvSpPr>
-          <p:cNvPr id="1118560381" name="Text Placeholder 3"/>
+          <p:cNvPr id="1154944998" name="Text Placeholder 3"/>
           <p:cNvSpPr>
             <a:spLocks noGrp="1"/>
           </p:cNvSpPr>
@@ -3396,7 +3396,7 @@
       </p:sp>
       <p:sp>
         <p:nvSpPr>
-          <p:cNvPr id="1216910752" name="Date Placeholder 4"/>
+          <p:cNvPr id="1066608501" name="Date Placeholder 4"/>
           <p:cNvSpPr>
             <a:spLocks noGrp="1"/>
           </p:cNvSpPr>
@@ -3422,7 +3422,7 @@
       </p:sp>
       <p:sp>
         <p:nvSpPr>
-          <p:cNvPr id="1611897804" name="Footer Placeholder 5"/>
+          <p:cNvPr id="242773074" name="Footer Placeholder 5"/>
           <p:cNvSpPr>
             <a:spLocks noGrp="1"/>
           </p:cNvSpPr>
@@ -3444,7 +3444,7 @@
       </p:sp>
       <p:sp>
         <p:nvSpPr>
-          <p:cNvPr id="382018852" name="Slide Number Placeholder 6"/>
+          <p:cNvPr id="213300868" name="Slide Number Placeholder 6"/>
           <p:cNvSpPr>
             <a:spLocks noGrp="1"/>
           </p:cNvSpPr>
@@ -3495,7 +3495,7 @@
       </p:grpSpPr>
       <p:sp>
         <p:nvSpPr>
-          <p:cNvPr id="879712378" name="Title 1"/>
+          <p:cNvPr id="274079800" name="Title 1"/>
           <p:cNvSpPr>
             <a:spLocks noGrp="1"/>
           </p:cNvSpPr>
@@ -3530,7 +3530,7 @@
       </p:sp>
       <p:sp>
         <p:nvSpPr>
-          <p:cNvPr id="952466208" name="Picture Placeholder 2"/>
+          <p:cNvPr id="966235643" name="Picture Placeholder 2"/>
           <p:cNvSpPr>
             <a:spLocks noChangeAspect="1" noGrp="1"/>
           </p:cNvSpPr>
@@ -3598,7 +3598,7 @@
       </p:sp>
       <p:sp>
         <p:nvSpPr>
-          <p:cNvPr id="78069432" name="Text Placeholder 3"/>
+          <p:cNvPr id="472635819" name="Text Placeholder 3"/>
           <p:cNvSpPr>
             <a:spLocks noGrp="1"/>
           </p:cNvSpPr>
@@ -3666,7 +3666,7 @@
       </p:sp>
       <p:sp>
         <p:nvSpPr>
-          <p:cNvPr id="1742084300" name="Date Placeholder 4"/>
+          <p:cNvPr id="1921543635" name="Date Placeholder 4"/>
           <p:cNvSpPr>
             <a:spLocks noGrp="1"/>
           </p:cNvSpPr>
@@ -3692,7 +3692,7 @@
       </p:sp>
       <p:sp>
         <p:nvSpPr>
-          <p:cNvPr id="1414151284" name="Footer Placeholder 5"/>
+          <p:cNvPr id="536752436" name="Footer Placeholder 5"/>
           <p:cNvSpPr>
             <a:spLocks noGrp="1"/>
           </p:cNvSpPr>
@@ -3714,7 +3714,7 @@
       </p:sp>
       <p:sp>
         <p:nvSpPr>
-          <p:cNvPr id="1344585209" name="Slide Number Placeholder 6"/>
+          <p:cNvPr id="539118453" name="Slide Number Placeholder 6"/>
           <p:cNvSpPr>
             <a:spLocks noGrp="1"/>
           </p:cNvSpPr>
@@ -3770,7 +3770,7 @@
       </p:grpSpPr>
       <p:sp>
         <p:nvSpPr>
-          <p:cNvPr id="1468185751" name="Title Placeholder 1"/>
+          <p:cNvPr id="242758661" name="Title Placeholder 1"/>
           <p:cNvSpPr>
             <a:spLocks noGrp="1"/>
           </p:cNvSpPr>
@@ -3806,7 +3806,7 @@
       </p:sp>
       <p:sp>
         <p:nvSpPr>
-          <p:cNvPr id="1516985989" name="Text Placeholder 2"/>
+          <p:cNvPr id="800511464" name="Text Placeholder 2"/>
           <p:cNvSpPr>
             <a:spLocks noGrp="1"/>
           </p:cNvSpPr>
@@ -3882,7 +3882,7 @@
       </p:sp>
       <p:sp>
         <p:nvSpPr>
-          <p:cNvPr id="1911158641" name="Date Placeholder 3"/>
+          <p:cNvPr id="2121270873" name="Date Placeholder 3"/>
           <p:cNvSpPr>
             <a:spLocks noGrp="1"/>
           </p:cNvSpPr>
@@ -3926,7 +3926,7 @@
       </p:sp>
       <p:sp>
         <p:nvSpPr>
-          <p:cNvPr id="1321731264" name="Footer Placeholder 4"/>
+          <p:cNvPr id="1355231578" name="Footer Placeholder 4"/>
           <p:cNvSpPr>
             <a:spLocks noGrp="1"/>
           </p:cNvSpPr>
@@ -3966,7 +3966,7 @@
       </p:sp>
       <p:sp>
         <p:nvSpPr>
-          <p:cNvPr id="1301523020" name="Slide Number Placeholder 5"/>
+          <p:cNvPr id="1100976119" name="Slide Number Placeholder 5"/>
           <p:cNvSpPr>
             <a:spLocks noGrp="1"/>
           </p:cNvSpPr>
@@ -4417,12 +4417,15 @@
               <a:defRPr/>
             </a:pPr>
             <a:r>
-              <a:rPr>
+              <a:rPr lang="en-US" sz="1800" b="0" i="0" u="none" strike="noStrike" cap="none" spc="0">
+                <a:solidFill>
+                  <a:schemeClr val="lt1"/>
+                </a:solidFill>
                 <a:latin typeface="Open Sans"/>
                 <a:ea typeface="Open Sans"/>
                 <a:cs typeface="Open Sans"/>
               </a:rPr>
-              <a:t>PE</a:t>
+              <a:t>Processor</a:t>
             </a:r>
             <a:endParaRPr>
               <a:latin typeface="Open Sans"/>
@@ -4483,7 +4486,7 @@
         <p:spPr bwMode="auto">
           <a:xfrm rot="0" flipH="0" flipV="0">
             <a:off x="4225902" y="2842616"/>
-            <a:ext cx="1180782" cy="366119"/>
+            <a:ext cx="1181142" cy="366119"/>
           </a:xfrm>
           <a:prstGeom prst="rect">
             <a:avLst/>
@@ -4504,7 +4507,7 @@
                 <a:ea typeface="Open Sans"/>
                 <a:cs typeface="Open Sans"/>
               </a:rPr>
-              <a:t>Bytes/s</a:t>
+              <a:t>Byte/s</a:t>
             </a:r>
             <a:endParaRPr>
               <a:latin typeface="Open Sans"/>
@@ -4722,7 +4725,7 @@
         <p:spPr bwMode="auto">
           <a:xfrm rot="0" flipH="0" flipV="0">
             <a:off x="8337338" y="2533053"/>
-            <a:ext cx="3533346" cy="1189079"/>
+            <a:ext cx="3534066" cy="1189079"/>
           </a:xfrm>
           <a:prstGeom prst="rect">
             <a:avLst/>
@@ -4737,13 +4740,24 @@
             <a:pPr algn="ctr">
               <a:defRPr/>
             </a:pPr>
+            <a:r>
+              <a:rPr lang="en-US" sz="1800" b="0" i="0" u="none" strike="noStrike" cap="none" spc="0">
+                <a:solidFill>
+                  <a:schemeClr val="tx1"/>
+                </a:solidFill>
+                <a:latin typeface="Open Sans"/>
+                <a:ea typeface="Open Sans"/>
+                <a:cs typeface="Open Sans"/>
+              </a:rPr>
+              <a:t>Processor</a:t>
+            </a:r>
             <a:r>
               <a:rPr>
                 <a:latin typeface="Open Sans"/>
                 <a:ea typeface="Open Sans"/>
                 <a:cs typeface="Open Sans"/>
               </a:rPr>
-              <a:t>PE = CPU/GPU</a:t>
+              <a:t> = CPU/GPU</a:t>
             </a:r>
             <a:endParaRPr>
               <a:latin typeface="Open Sans"/>
@@ -4902,7 +4916,7 @@
         <p:spPr bwMode="auto">
           <a:xfrm rot="0" flipH="0" flipV="0">
             <a:off x="3336712" y="5092896"/>
-            <a:ext cx="3548826" cy="640440"/>
+            <a:ext cx="3549186" cy="640440"/>
           </a:xfrm>
           <a:prstGeom prst="rect">
             <a:avLst/>
@@ -4923,7 +4937,7 @@
                 <a:ea typeface="Open Sans"/>
                 <a:cs typeface="Open Sans"/>
               </a:rPr>
-              <a:t>Ops/Byte</a:t>
+              <a:t>Op/Byte</a:t>
             </a:r>
             <a:endParaRPr>
               <a:latin typeface="Open Sans"/>
@@ -4959,7 +4973,7 @@
         <p:spPr bwMode="auto">
           <a:xfrm rot="0" flipH="0" flipV="0">
             <a:off x="758139" y="2864701"/>
-            <a:ext cx="1893243" cy="640440"/>
+            <a:ext cx="1893603" cy="640440"/>
           </a:xfrm>
           <a:prstGeom prst="rect">
             <a:avLst/>
@@ -4980,7 +4994,7 @@
                 <a:ea typeface="Open Sans"/>
                 <a:cs typeface="Open Sans"/>
               </a:rPr>
-              <a:t>Ops/s</a:t>
+              <a:t>Op/s</a:t>
             </a:r>
             <a:endParaRPr>
               <a:latin typeface="Open Sans"/>
@@ -5348,7 +5362,7 @@
         <p:spPr bwMode="auto">
           <a:xfrm rot="0" flipH="0" flipV="0">
             <a:off x="3336712" y="5092896"/>
-            <a:ext cx="3548826" cy="640440"/>
+            <a:ext cx="3549186" cy="640440"/>
           </a:xfrm>
           <a:prstGeom prst="rect">
             <a:avLst/>
@@ -5369,7 +5383,7 @@
                 <a:ea typeface="Open Sans"/>
                 <a:cs typeface="Open Sans"/>
               </a:rPr>
-              <a:t>Ops/Byte</a:t>
+              <a:t>Op/Byte</a:t>
             </a:r>
             <a:endParaRPr>
               <a:latin typeface="Open Sans"/>
@@ -5405,7 +5419,7 @@
         <p:spPr bwMode="auto">
           <a:xfrm rot="0" flipH="0" flipV="0">
             <a:off x="758139" y="2864701"/>
-            <a:ext cx="1893243" cy="640440"/>
+            <a:ext cx="1893603" cy="640440"/>
           </a:xfrm>
           <a:prstGeom prst="rect">
             <a:avLst/>
@@ -5426,7 +5440,7 @@
                 <a:ea typeface="Open Sans"/>
                 <a:cs typeface="Open Sans"/>
               </a:rPr>
-              <a:t>Ops/s</a:t>
+              <a:t>Op/s</a:t>
             </a:r>
             <a:endParaRPr>
               <a:latin typeface="Open Sans"/>
@@ -6145,7 +6159,7 @@
         <p:spPr bwMode="auto">
           <a:xfrm rot="0" flipH="0" flipV="0">
             <a:off x="3336712" y="5092896"/>
-            <a:ext cx="3548826" cy="640440"/>
+            <a:ext cx="3549186" cy="640440"/>
           </a:xfrm>
           <a:prstGeom prst="rect">
             <a:avLst/>
@@ -6166,7 +6180,7 @@
                 <a:ea typeface="Open Sans"/>
                 <a:cs typeface="Open Sans"/>
               </a:rPr>
-              <a:t>Ops/Byte</a:t>
+              <a:t>Op/Byte</a:t>
             </a:r>
             <a:endParaRPr>
               <a:latin typeface="Open Sans"/>
@@ -6202,7 +6216,7 @@
         <p:spPr bwMode="auto">
           <a:xfrm rot="0" flipH="0" flipV="0">
             <a:off x="758139" y="2864701"/>
-            <a:ext cx="1893243" cy="640440"/>
+            <a:ext cx="1893603" cy="640440"/>
           </a:xfrm>
           <a:prstGeom prst="rect">
             <a:avLst/>
@@ -6223,7 +6237,7 @@
                 <a:ea typeface="Open Sans"/>
                 <a:cs typeface="Open Sans"/>
               </a:rPr>
-              <a:t>Ops/s</a:t>
+              <a:t>Op/s</a:t>
             </a:r>
             <a:endParaRPr>
               <a:latin typeface="Open Sans"/>
@@ -6876,7 +6890,7 @@
         <p:spPr bwMode="auto">
           <a:xfrm rot="0" flipH="0" flipV="0">
             <a:off x="3336712" y="5092896"/>
-            <a:ext cx="3548826" cy="640440"/>
+            <a:ext cx="3549186" cy="640440"/>
           </a:xfrm>
           <a:prstGeom prst="rect">
             <a:avLst/>
@@ -6897,7 +6911,7 @@
                 <a:ea typeface="Open Sans"/>
                 <a:cs typeface="Open Sans"/>
               </a:rPr>
-              <a:t>Ops/Byte</a:t>
+              <a:t>Op/Byte</a:t>
             </a:r>
             <a:endParaRPr>
               <a:latin typeface="Open Sans"/>
@@ -6933,7 +6947,7 @@
         <p:spPr bwMode="auto">
           <a:xfrm rot="0" flipH="0" flipV="0">
             <a:off x="758139" y="2864701"/>
-            <a:ext cx="1893243" cy="640440"/>
+            <a:ext cx="1893603" cy="640440"/>
           </a:xfrm>
           <a:prstGeom prst="rect">
             <a:avLst/>
@@ -6954,7 +6968,7 @@
                 <a:ea typeface="Open Sans"/>
                 <a:cs typeface="Open Sans"/>
               </a:rPr>
-              <a:t>Ops/s</a:t>
+              <a:t>Op/s</a:t>
             </a:r>
             <a:endParaRPr>
               <a:latin typeface="Open Sans"/>
@@ -7331,8 +7345,8 @@
         </p:nvSpPr>
         <p:spPr bwMode="auto">
           <a:xfrm rot="0" flipH="0" flipV="0">
-            <a:off x="4603424" y="3461846"/>
-            <a:ext cx="2047126" cy="274679"/>
+            <a:off x="4249244" y="3461846"/>
+            <a:ext cx="2758724" cy="274679"/>
           </a:xfrm>
           <a:prstGeom prst="rect">
             <a:avLst/>
@@ -7353,7 +7367,7 @@
                 <a:ea typeface="Open Sans"/>
                 <a:cs typeface="Open Sans"/>
               </a:rPr>
-              <a:t>Peak Perf = 1.5 Ops/s</a:t>
+              <a:t>Peak Performance = 1.5 Ops/s</a:t>
             </a:r>
             <a:endParaRPr sz="1200">
               <a:latin typeface="Open Sans"/>
@@ -7681,8 +7695,8 @@
         </p:nvCxnSpPr>
         <p:spPr bwMode="auto">
           <a:xfrm rot="0" flipH="1" flipV="1">
-            <a:off x="2769726" y="1205507"/>
-            <a:ext cx="0" cy="3958827"/>
+            <a:off x="2769726" y="2598932"/>
+            <a:ext cx="0" cy="2565403"/>
           </a:xfrm>
           <a:prstGeom prst="line">
             <a:avLst/>
@@ -7722,7 +7736,7 @@
         <p:spPr bwMode="auto">
           <a:xfrm rot="0" flipH="0" flipV="0">
             <a:off x="2427421" y="4896444"/>
-            <a:ext cx="4777382" cy="0"/>
+            <a:ext cx="4095199" cy="0"/>
           </a:xfrm>
           <a:prstGeom prst="line">
             <a:avLst/>
@@ -7761,8 +7775,8 @@
         </p:nvSpPr>
         <p:spPr bwMode="auto">
           <a:xfrm rot="0" flipH="0" flipV="0">
-            <a:off x="3336712" y="5092896"/>
-            <a:ext cx="3548826" cy="640440"/>
+            <a:off x="3336712" y="4909723"/>
+            <a:ext cx="3549186" cy="640440"/>
           </a:xfrm>
           <a:prstGeom prst="rect">
             <a:avLst/>
@@ -7783,7 +7797,7 @@
                 <a:ea typeface="Open Sans"/>
                 <a:cs typeface="Open Sans"/>
               </a:rPr>
-              <a:t>Ops/Byte</a:t>
+              <a:t>Op/Byte</a:t>
             </a:r>
             <a:endParaRPr>
               <a:latin typeface="Open Sans"/>
@@ -7818,8 +7832,8 @@
         </p:nvSpPr>
         <p:spPr bwMode="auto">
           <a:xfrm rot="0" flipH="0" flipV="0">
-            <a:off x="758139" y="2864701"/>
-            <a:ext cx="1893243" cy="640440"/>
+            <a:off x="993231" y="3503288"/>
+            <a:ext cx="1893603" cy="640440"/>
           </a:xfrm>
           <a:prstGeom prst="rect">
             <a:avLst/>
@@ -7840,7 +7854,7 @@
                 <a:ea typeface="Open Sans"/>
                 <a:cs typeface="Open Sans"/>
               </a:rPr>
-              <a:t>Ops/s</a:t>
+              <a:t>Op/s</a:t>
             </a:r>
             <a:endParaRPr>
               <a:latin typeface="Open Sans"/>
@@ -7875,7 +7889,7 @@
         </p:nvSpPr>
         <p:spPr bwMode="auto">
           <a:xfrm rot="0" flipH="0" flipV="0">
-            <a:off x="3232533" y="4536822"/>
+            <a:off x="3232533" y="4610091"/>
             <a:ext cx="104179" cy="89296"/>
           </a:xfrm>
           <a:prstGeom prst="ellipse">
@@ -7907,7 +7921,7 @@
         </p:nvSpPr>
         <p:spPr bwMode="auto">
           <a:xfrm rot="0" flipH="0" flipV="0">
-            <a:off x="3832629" y="4536822"/>
+            <a:off x="3702743" y="4610091"/>
             <a:ext cx="104179" cy="89296"/>
           </a:xfrm>
           <a:prstGeom prst="ellipse">
@@ -7985,7 +7999,7 @@
         <p:spPr bwMode="auto">
           <a:xfrm rot="0" flipH="0" flipV="0">
             <a:off x="4183227" y="2598932"/>
-            <a:ext cx="2040646" cy="274679"/>
+            <a:ext cx="2339394" cy="274679"/>
           </a:xfrm>
           <a:prstGeom prst="rect">
             <a:avLst/>
@@ -7997,7 +8011,7 @@
             <a:spAutoFit/>
           </a:bodyPr>
           <a:p>
-            <a:pPr algn="ctr">
+            <a:pPr algn="l">
               <a:defRPr/>
             </a:pPr>
             <a:r>
@@ -8006,7 +8020,7 @@
                 <a:ea typeface="Open Sans"/>
                 <a:cs typeface="Open Sans"/>
               </a:rPr>
-              <a:t>Bandwidth = 1.5 Bytes/s</a:t>
+              <a:t>Max Bandwidth</a:t>
             </a:r>
             <a:endParaRPr sz="1200">
               <a:latin typeface="Open Sans"/>
@@ -8065,8 +8079,8 @@
         </p:nvSpPr>
         <p:spPr bwMode="auto">
           <a:xfrm rot="0" flipH="0" flipV="0">
-            <a:off x="4369628" y="3429000"/>
-            <a:ext cx="2047126" cy="274679"/>
+            <a:off x="4129176" y="3429000"/>
+            <a:ext cx="2531630" cy="274679"/>
           </a:xfrm>
           <a:prstGeom prst="rect">
             <a:avLst/>
@@ -8087,7 +8101,7 @@
                 <a:ea typeface="Open Sans"/>
                 <a:cs typeface="Open Sans"/>
               </a:rPr>
-              <a:t>Peak Perf = 1.5 Ops/s</a:t>
+              <a:t>Peak Performance</a:t>
             </a:r>
             <a:endParaRPr sz="1200">
               <a:latin typeface="Open Sans"/>
@@ -8139,14 +8153,14 @@
         </p:nvSpPr>
         <p:spPr bwMode="auto">
           <a:xfrm rot="0" flipH="0" flipV="0">
-            <a:off x="3232533" y="4227259"/>
+            <a:off x="3702743" y="4182611"/>
             <a:ext cx="104179" cy="89296"/>
           </a:xfrm>
           <a:prstGeom prst="ellipse">
             <a:avLst/>
           </a:prstGeom>
           <a:solidFill>
-            <a:srgbClr val="FF0000"/>
+            <a:schemeClr val="accent6"/>
           </a:solidFill>
         </p:spPr>
         <p:style>
@@ -8204,6 +8218,76 @@
             </a:endParaRPr>
           </a:p>
         </p:txBody>
+      </p:sp>
+      <p:sp>
+        <p:nvSpPr>
+          <p:cNvPr id="1004978206" name=""/>
+          <p:cNvSpPr/>
+          <p:nvPr/>
+        </p:nvSpPr>
+        <p:spPr bwMode="auto">
+          <a:xfrm rot="0" flipH="0" flipV="0">
+            <a:off x="3415096" y="4601307"/>
+            <a:ext cx="219807" cy="95249"/>
+          </a:xfrm>
+          <a:prstGeom prst="rightArrow">
+            <a:avLst>
+              <a:gd name="adj1" fmla="val 50000"/>
+              <a:gd name="adj2" fmla="val 50000"/>
+            </a:avLst>
+          </a:prstGeom>
+        </p:spPr>
+        <p:style>
+          <a:lnRef idx="2">
+            <a:schemeClr val="accent1">
+              <a:shade val="50000"/>
+            </a:schemeClr>
+          </a:lnRef>
+          <a:fillRef idx="1">
+            <a:schemeClr val="accent1"/>
+          </a:fillRef>
+          <a:effectRef idx="0">
+            <a:schemeClr val="accent1"/>
+          </a:effectRef>
+          <a:fontRef idx="minor">
+            <a:schemeClr val="lt1"/>
+          </a:fontRef>
+        </p:style>
+      </p:sp>
+      <p:sp>
+        <p:nvSpPr>
+          <p:cNvPr id="1667846158" name=""/>
+          <p:cNvSpPr/>
+          <p:nvPr/>
+        </p:nvSpPr>
+        <p:spPr bwMode="auto">
+          <a:xfrm rot="16199969" flipH="0" flipV="0">
+            <a:off x="3644929" y="4396153"/>
+            <a:ext cx="219807" cy="95249"/>
+          </a:xfrm>
+          <a:prstGeom prst="rightArrow">
+            <a:avLst>
+              <a:gd name="adj1" fmla="val 50000"/>
+              <a:gd name="adj2" fmla="val 50000"/>
+            </a:avLst>
+          </a:prstGeom>
+        </p:spPr>
+        <p:style>
+          <a:lnRef idx="2">
+            <a:schemeClr val="accent1">
+              <a:shade val="50000"/>
+            </a:schemeClr>
+          </a:lnRef>
+          <a:fillRef idx="1">
+            <a:schemeClr val="accent1"/>
+          </a:fillRef>
+          <a:effectRef idx="0">
+            <a:schemeClr val="accent1"/>
+          </a:effectRef>
+          <a:fontRef idx="minor">
+            <a:schemeClr val="lt1"/>
+          </a:fontRef>
+        </p:style>
       </p:sp>
     </p:spTree>
   </p:cSld>
@@ -8616,11 +8700,247 @@
                 <a:tableStyleId>{5940675A-B579-460E-94D1-54222C63F5DA}</a:tableStyleId>
               </a:tblPr>
               <a:tblGrid>
-                <a:gridCol w="476195"/>
-                <a:gridCol w="476195"/>
-                <a:gridCol w="476195"/>
-                <a:gridCol w="476195"/>
-                <a:gridCol w="476195"/>
+                <a:gridCol w="221081"/>
+                <a:gridCol w="221081"/>
+                <a:gridCol w="221081"/>
+                <a:gridCol w="221081"/>
+                <a:gridCol w="221081"/>
+              </a:tblGrid>
+              <a:tr h="266140">
+                <a:tc>
+                  <a:txBody>
+                    <a:bodyPr/>
+                    <a:p>
+                      <a:pPr>
+                        <a:defRPr/>
+                      </a:pPr>
+                      <a:endParaRPr sz="500"/>
+                    </a:p>
+                  </a:txBody>
+                  <a:tcPr>
+                    <a:solidFill>
+                      <a:schemeClr val="accent6"/>
+                    </a:solidFill>
+                  </a:tcPr>
+                </a:tc>
+                <a:tc>
+                  <a:txBody>
+                    <a:bodyPr/>
+                    <a:p>
+                      <a:pPr>
+                        <a:defRPr/>
+                      </a:pPr>
+                      <a:endParaRPr sz="500"/>
+                    </a:p>
+                  </a:txBody>
+                  <a:tcPr/>
+                </a:tc>
+                <a:tc>
+                  <a:txBody>
+                    <a:bodyPr/>
+                    <a:p>
+                      <a:pPr>
+                        <a:defRPr/>
+                      </a:pPr>
+                      <a:endParaRPr sz="500"/>
+                    </a:p>
+                  </a:txBody>
+                  <a:tcPr/>
+                </a:tc>
+                <a:tc>
+                  <a:txBody>
+                    <a:bodyPr/>
+                    <a:p>
+                      <a:pPr>
+                        <a:defRPr/>
+                      </a:pPr>
+                      <a:endParaRPr sz="500"/>
+                    </a:p>
+                  </a:txBody>
+                  <a:tcPr/>
+                </a:tc>
+                <a:tc>
+                  <a:txBody>
+                    <a:bodyPr/>
+                    <a:p>
+                      <a:pPr>
+                        <a:defRPr/>
+                      </a:pPr>
+                      <a:endParaRPr sz="500"/>
+                    </a:p>
+                  </a:txBody>
+                  <a:tcPr/>
+                </a:tc>
+              </a:tr>
+            </a:tbl>
+          </a:graphicData>
+        </a:graphic>
+      </p:graphicFrame>
+      <p:sp>
+        <p:nvSpPr>
+          <p:cNvPr id="517144460" name=""/>
+          <p:cNvSpPr/>
+          <p:nvPr/>
+        </p:nvSpPr>
+        <p:spPr bwMode="auto">
+          <a:xfrm rot="0" flipH="0" flipV="0">
+            <a:off x="806181" y="4409401"/>
+            <a:ext cx="1121352" cy="525664"/>
+          </a:xfrm>
+          <a:prstGeom prst="rect">
+            <a:avLst/>
+          </a:prstGeom>
+          <a:noFill/>
+          <a:ln w="38099" cap="flat" cmpd="sng" algn="ctr">
+            <a:solidFill>
+              <a:schemeClr val="tx1">
+                <a:lumMod val="74901"/>
+                <a:lumOff val="25099"/>
+                <a:alpha val="26999"/>
+              </a:schemeClr>
+            </a:solidFill>
+            <a:prstDash val="sysDash"/>
+            <a:miter lim="800000"/>
+          </a:ln>
+        </p:spPr>
+        <p:style>
+          <a:lnRef idx="2">
+            <a:schemeClr val="accent1">
+              <a:shade val="50000"/>
+            </a:schemeClr>
+          </a:lnRef>
+          <a:fillRef idx="1">
+            <a:schemeClr val="accent1"/>
+          </a:fillRef>
+          <a:effectRef idx="0">
+            <a:schemeClr val="accent1"/>
+          </a:effectRef>
+          <a:fontRef idx="minor">
+            <a:schemeClr val="lt1"/>
+          </a:fontRef>
+        </p:style>
+      </p:sp>
+      <p:sp>
+        <p:nvSpPr>
+          <p:cNvPr id="469402008" name=""/>
+          <p:cNvSpPr txBox="1"/>
+          <p:nvPr/>
+        </p:nvSpPr>
+        <p:spPr bwMode="auto">
+          <a:xfrm rot="0" flipH="0" flipV="0">
+            <a:off x="806181" y="5016023"/>
+            <a:ext cx="1122975" cy="274679"/>
+          </a:xfrm>
+          <a:prstGeom prst="rect">
+            <a:avLst/>
+          </a:prstGeom>
+          <a:noFill/>
+        </p:spPr>
+        <p:txBody>
+          <a:bodyPr vertOverflow="overflow" horzOverflow="overflow" vert="horz" wrap="square" lIns="91440" tIns="45720" rIns="91440" bIns="45720" numCol="1" spcCol="0" rtlCol="0" fromWordArt="0" anchor="t" anchorCtr="0" forceAA="0" upright="0" compatLnSpc="0">
+            <a:spAutoFit/>
+          </a:bodyPr>
+          <a:p>
+            <a:pPr algn="ctr">
+              <a:defRPr/>
+            </a:pPr>
+            <a:r>
+              <a:rPr sz="1200">
+                <a:latin typeface="Open Sans"/>
+                <a:ea typeface="Open Sans"/>
+                <a:cs typeface="Open Sans"/>
+              </a:rPr>
+              <a:t>Cache Line</a:t>
+            </a:r>
+            <a:endParaRPr sz="1200">
+              <a:latin typeface="Open Sans"/>
+              <a:cs typeface="Open Sans"/>
+            </a:endParaRPr>
+          </a:p>
+        </p:txBody>
+      </p:sp>
+      <p:sp>
+        <p:nvSpPr>
+          <p:cNvPr id="1391847854" name=""/>
+          <p:cNvSpPr txBox="1"/>
+          <p:nvPr/>
+        </p:nvSpPr>
+        <p:spPr bwMode="auto">
+          <a:xfrm rot="0" flipH="0" flipV="0">
+            <a:off x="973829" y="1897545"/>
+            <a:ext cx="2279216" cy="274679"/>
+          </a:xfrm>
+          <a:prstGeom prst="rect">
+            <a:avLst/>
+          </a:prstGeom>
+          <a:noFill/>
+        </p:spPr>
+        <p:txBody>
+          <a:bodyPr vertOverflow="overflow" horzOverflow="overflow" vert="horz" wrap="square" lIns="91440" tIns="45720" rIns="91440" bIns="45720" numCol="1" spcCol="0" rtlCol="0" fromWordArt="0" anchor="t" anchorCtr="0" forceAA="0" upright="0" compatLnSpc="0">
+            <a:spAutoFit/>
+          </a:bodyPr>
+          <a:p>
+            <a:pPr algn="ctr">
+              <a:defRPr/>
+            </a:pPr>
+            <a:r>
+              <a:rPr sz="1200">
+                <a:latin typeface="Open Sans"/>
+                <a:ea typeface="Open Sans"/>
+                <a:cs typeface="Open Sans"/>
+              </a:rPr>
+              <a:t>B matrix is not transposed</a:t>
+            </a:r>
+            <a:r>
+              <a:rPr sz="1050" b="0" i="0" u="none">
+                <a:solidFill>
+                  <a:srgbClr val="BFBFBF"/>
+                </a:solidFill>
+                <a:latin typeface="Arial"/>
+                <a:ea typeface="Arial"/>
+                <a:cs typeface="Arial"/>
+              </a:rPr>
+              <a:t>❌</a:t>
+            </a:r>
+            <a:r>
+              <a:rPr sz="1200">
+                <a:latin typeface="Open Sans"/>
+                <a:ea typeface="Open Sans"/>
+                <a:cs typeface="Open Sans"/>
+              </a:rPr>
+              <a:t> B matrix is not transposed</a:t>
+            </a:r>
+            <a:endParaRPr sz="1200">
+              <a:latin typeface="Open Sans"/>
+              <a:cs typeface="Open Sans"/>
+            </a:endParaRPr>
+          </a:p>
+        </p:txBody>
+      </p:sp>
+      <p:graphicFrame>
+        <p:nvGraphicFramePr>
+          <p:cNvPr id="1656975111" name=""/>
+          <p:cNvGraphicFramePr>
+            <a:graphicFrameLocks xmlns:a="http://schemas.openxmlformats.org/drawingml/2006/main"/>
+          </p:cNvGraphicFramePr>
+          <p:nvPr/>
+        </p:nvGraphicFramePr>
+        <p:xfrm>
+          <a:off x="4523893" y="2263486"/>
+          <a:ext cx="2393681" cy="1841499"/>
+        </p:xfrm>
+        <a:graphic>
+          <a:graphicData uri="http://schemas.openxmlformats.org/drawingml/2006/table">
+            <a:tbl>
+              <a:tblPr firstRow="1" firstCol="0" lastRow="0" lastCol="0" bandRow="1" bandCol="0">
+                <a:tableStyleId>{5940675A-B579-460E-94D1-54222C63F5DA}</a:tableStyleId>
+              </a:tblPr>
+              <a:tblGrid>
+                <a:gridCol w="476196"/>
+                <a:gridCol w="476196"/>
+                <a:gridCol w="476196"/>
+                <a:gridCol w="476196"/>
+                <a:gridCol w="476196"/>
               </a:tblGrid>
               <a:tr h="341092">
                 <a:tc>
@@ -8637,6 +8957,278 @@
                     <a:solidFill>
                       <a:schemeClr val="accent6"/>
                     </a:solidFill>
+                  </a:tcPr>
+                </a:tc>
+                <a:tc>
+                  <a:txBody>
+                    <a:bodyPr/>
+                    <a:p>
+                      <a:pPr>
+                        <a:defRPr/>
+                      </a:pPr>
+                      <a:endParaRPr/>
+                    </a:p>
+                  </a:txBody>
+                  <a:tcPr>
+                    <a:solidFill>
+                      <a:schemeClr val="accent6"/>
+                    </a:solidFill>
+                  </a:tcPr>
+                </a:tc>
+                <a:tc>
+                  <a:txBody>
+                    <a:bodyPr/>
+                    <a:p>
+                      <a:pPr>
+                        <a:defRPr/>
+                      </a:pPr>
+                      <a:endParaRPr/>
+                    </a:p>
+                  </a:txBody>
+                  <a:tcPr>
+                    <a:solidFill>
+                      <a:schemeClr val="accent6"/>
+                    </a:solidFill>
+                  </a:tcPr>
+                </a:tc>
+                <a:tc>
+                  <a:txBody>
+                    <a:bodyPr/>
+                    <a:p>
+                      <a:pPr>
+                        <a:defRPr/>
+                      </a:pPr>
+                      <a:endParaRPr/>
+                    </a:p>
+                  </a:txBody>
+                  <a:tcPr>
+                    <a:solidFill>
+                      <a:schemeClr val="accent6"/>
+                    </a:solidFill>
+                  </a:tcPr>
+                </a:tc>
+                <a:tc>
+                  <a:txBody>
+                    <a:bodyPr/>
+                    <a:p>
+                      <a:pPr>
+                        <a:defRPr/>
+                      </a:pPr>
+                      <a:endParaRPr/>
+                    </a:p>
+                  </a:txBody>
+                  <a:tcPr>
+                    <a:solidFill>
+                      <a:schemeClr val="accent6"/>
+                    </a:solidFill>
+                  </a:tcPr>
+                </a:tc>
+              </a:tr>
+              <a:tr h="363984">
+                <a:tc>
+                  <a:txBody>
+                    <a:bodyPr/>
+                    <a:p>
+                      <a:pPr>
+                        <a:defRPr/>
+                      </a:pPr>
+                      <a:endParaRPr/>
+                    </a:p>
+                  </a:txBody>
+                  <a:tcPr>
+                    <a:noFill/>
+                  </a:tcPr>
+                </a:tc>
+                <a:tc>
+                  <a:txBody>
+                    <a:bodyPr/>
+                    <a:p>
+                      <a:pPr>
+                        <a:defRPr/>
+                      </a:pPr>
+                      <a:endParaRPr/>
+                    </a:p>
+                  </a:txBody>
+                  <a:tcPr/>
+                </a:tc>
+                <a:tc>
+                  <a:txBody>
+                    <a:bodyPr/>
+                    <a:p>
+                      <a:pPr>
+                        <a:defRPr/>
+                      </a:pPr>
+                      <a:endParaRPr/>
+                    </a:p>
+                  </a:txBody>
+                  <a:tcPr/>
+                </a:tc>
+                <a:tc>
+                  <a:txBody>
+                    <a:bodyPr/>
+                    <a:p>
+                      <a:pPr>
+                        <a:defRPr/>
+                      </a:pPr>
+                      <a:endParaRPr/>
+                    </a:p>
+                  </a:txBody>
+                  <a:tcPr/>
+                </a:tc>
+                <a:tc>
+                  <a:txBody>
+                    <a:bodyPr/>
+                    <a:p>
+                      <a:pPr>
+                        <a:defRPr/>
+                      </a:pPr>
+                      <a:endParaRPr/>
+                    </a:p>
+                  </a:txBody>
+                  <a:tcPr/>
+                </a:tc>
+              </a:tr>
+              <a:tr h="341092">
+                <a:tc>
+                  <a:txBody>
+                    <a:bodyPr/>
+                    <a:p>
+                      <a:pPr>
+                        <a:defRPr/>
+                      </a:pPr>
+                      <a:endParaRPr/>
+                    </a:p>
+                  </a:txBody>
+                  <a:tcPr>
+                    <a:noFill/>
+                  </a:tcPr>
+                </a:tc>
+                <a:tc>
+                  <a:txBody>
+                    <a:bodyPr/>
+                    <a:p>
+                      <a:pPr>
+                        <a:defRPr/>
+                      </a:pPr>
+                      <a:endParaRPr/>
+                    </a:p>
+                  </a:txBody>
+                  <a:tcPr/>
+                </a:tc>
+                <a:tc>
+                  <a:txBody>
+                    <a:bodyPr/>
+                    <a:p>
+                      <a:pPr>
+                        <a:defRPr/>
+                      </a:pPr>
+                      <a:endParaRPr/>
+                    </a:p>
+                  </a:txBody>
+                  <a:tcPr/>
+                </a:tc>
+                <a:tc>
+                  <a:txBody>
+                    <a:bodyPr/>
+                    <a:p>
+                      <a:pPr>
+                        <a:defRPr/>
+                      </a:pPr>
+                      <a:endParaRPr/>
+                    </a:p>
+                  </a:txBody>
+                  <a:tcPr/>
+                </a:tc>
+                <a:tc>
+                  <a:txBody>
+                    <a:bodyPr/>
+                    <a:p>
+                      <a:pPr>
+                        <a:defRPr/>
+                      </a:pPr>
+                      <a:endParaRPr/>
+                    </a:p>
+                  </a:txBody>
+                  <a:tcPr/>
+                </a:tc>
+              </a:tr>
+              <a:tr h="341092">
+                <a:tc>
+                  <a:txBody>
+                    <a:bodyPr/>
+                    <a:p>
+                      <a:pPr>
+                        <a:defRPr/>
+                      </a:pPr>
+                      <a:endParaRPr/>
+                    </a:p>
+                  </a:txBody>
+                  <a:tcPr>
+                    <a:noFill/>
+                  </a:tcPr>
+                </a:tc>
+                <a:tc>
+                  <a:txBody>
+                    <a:bodyPr/>
+                    <a:p>
+                      <a:pPr>
+                        <a:defRPr/>
+                      </a:pPr>
+                      <a:endParaRPr/>
+                    </a:p>
+                  </a:txBody>
+                  <a:tcPr/>
+                </a:tc>
+                <a:tc>
+                  <a:txBody>
+                    <a:bodyPr/>
+                    <a:p>
+                      <a:pPr>
+                        <a:defRPr/>
+                      </a:pPr>
+                      <a:endParaRPr/>
+                    </a:p>
+                  </a:txBody>
+                  <a:tcPr/>
+                </a:tc>
+                <a:tc>
+                  <a:txBody>
+                    <a:bodyPr/>
+                    <a:p>
+                      <a:pPr>
+                        <a:defRPr/>
+                      </a:pPr>
+                      <a:endParaRPr/>
+                    </a:p>
+                  </a:txBody>
+                  <a:tcPr/>
+                </a:tc>
+                <a:tc>
+                  <a:txBody>
+                    <a:bodyPr/>
+                    <a:p>
+                      <a:pPr>
+                        <a:defRPr/>
+                      </a:pPr>
+                      <a:endParaRPr/>
+                    </a:p>
+                  </a:txBody>
+                  <a:tcPr/>
+                </a:tc>
+              </a:tr>
+              <a:tr h="341092">
+                <a:tc>
+                  <a:txBody>
+                    <a:bodyPr/>
+                    <a:p>
+                      <a:pPr>
+                        <a:defRPr/>
+                      </a:pPr>
+                      <a:endParaRPr/>
+                    </a:p>
+                  </a:txBody>
+                  <a:tcPr>
+                    <a:noFill/>
                   </a:tcPr>
                 </a:tc>
                 <a:tc>
@@ -8692,16 +9284,74 @@
           </a:graphicData>
         </a:graphic>
       </p:graphicFrame>
+      <p:sp>
+        <p:nvSpPr>
+          <p:cNvPr id="2022390605" name=""/>
+          <p:cNvSpPr txBox="1"/>
+          <p:nvPr/>
+        </p:nvSpPr>
+        <p:spPr bwMode="auto">
+          <a:xfrm rot="0" flipH="0" flipV="0">
+            <a:off x="4692491" y="1897545"/>
+            <a:ext cx="2064765" cy="274679"/>
+          </a:xfrm>
+          <a:prstGeom prst="rect">
+            <a:avLst/>
+          </a:prstGeom>
+          <a:noFill/>
+        </p:spPr>
+        <p:txBody>
+          <a:bodyPr vertOverflow="overflow" horzOverflow="overflow" vert="horz" wrap="square" lIns="91440" tIns="45720" rIns="91440" bIns="45720" numCol="1" spcCol="0" rtlCol="0" fromWordArt="0" anchor="t" anchorCtr="0" forceAA="0" upright="0" compatLnSpc="0">
+            <a:spAutoFit/>
+          </a:bodyPr>
+          <a:p>
+            <a:pPr algn="ctr">
+              <a:defRPr/>
+            </a:pPr>
+            <a:r>
+              <a:rPr sz="1200">
+                <a:latin typeface="Open Sans"/>
+                <a:ea typeface="Open Sans"/>
+                <a:cs typeface="Open Sans"/>
+              </a:rPr>
+              <a:t>B matrix is transposed</a:t>
+            </a:r>
+            <a:r>
+              <a:rPr lang="en-US" sz="1200" b="0" i="0" u="none" strike="noStrike" cap="none" spc="0">
+                <a:solidFill>
+                  <a:schemeClr val="tx1"/>
+                </a:solidFill>
+                <a:latin typeface="Open Sans"/>
+                <a:ea typeface="Open Sans"/>
+                <a:cs typeface="Open Sans"/>
+              </a:rPr>
+              <a:t>✅</a:t>
+            </a:r>
+            <a:r>
+              <a:rPr sz="1200">
+                <a:latin typeface="Open Sans"/>
+                <a:ea typeface="Open Sans"/>
+                <a:cs typeface="Open Sans"/>
+              </a:rPr>
+              <a:t>B matrix is transposed</a:t>
+            </a:r>
+            <a:endParaRPr sz="1200">
+              <a:latin typeface="Open Sans"/>
+              <a:cs typeface="Open Sans"/>
+            </a:endParaRPr>
+          </a:p>
+        </p:txBody>
+      </p:sp>
       <p:graphicFrame>
         <p:nvGraphicFramePr>
-          <p:cNvPr id="1077108052" name=""/>
+          <p:cNvPr id="1824327284" name=""/>
           <p:cNvGraphicFramePr>
             <a:graphicFrameLocks xmlns:a="http://schemas.openxmlformats.org/drawingml/2006/main"/>
           </p:cNvGraphicFramePr>
           <p:nvPr/>
         </p:nvGraphicFramePr>
         <p:xfrm rot="0">
-          <a:off x="3299997" y="4546022"/>
+          <a:off x="2026227" y="4546022"/>
           <a:ext cx="2393680" cy="378459"/>
         </p:xfrm>
         <a:graphic>
@@ -8711,13 +9361,13 @@
                 <a:tableStyleId>{5940675A-B579-460E-94D1-54222C63F5DA}</a:tableStyleId>
               </a:tblPr>
               <a:tblGrid>
-                <a:gridCol w="476195"/>
-                <a:gridCol w="476195"/>
-                <a:gridCol w="476195"/>
-                <a:gridCol w="476195"/>
-                <a:gridCol w="476195"/>
+                <a:gridCol w="221081"/>
+                <a:gridCol w="221081"/>
+                <a:gridCol w="221081"/>
+                <a:gridCol w="221081"/>
+                <a:gridCol w="221081"/>
               </a:tblGrid>
-              <a:tr h="341092">
+              <a:tr h="266140">
                 <a:tc>
                   <a:txBody>
                     <a:bodyPr/>
@@ -8725,7 +9375,7 @@
                       <a:pPr>
                         <a:defRPr/>
                       </a:pPr>
-                      <a:endParaRPr/>
+                      <a:endParaRPr sz="500"/>
                     </a:p>
                   </a:txBody>
                   <a:tcPr>
@@ -8741,7 +9391,7 @@
                       <a:pPr>
                         <a:defRPr/>
                       </a:pPr>
-                      <a:endParaRPr/>
+                      <a:endParaRPr sz="500"/>
                     </a:p>
                   </a:txBody>
                   <a:tcPr/>
@@ -8753,7 +9403,7 @@
                       <a:pPr>
                         <a:defRPr/>
                       </a:pPr>
-                      <a:endParaRPr/>
+                      <a:endParaRPr sz="500"/>
                     </a:p>
                   </a:txBody>
                   <a:tcPr/>
@@ -8765,7 +9415,7 @@
                       <a:pPr>
                         <a:defRPr/>
                       </a:pPr>
-                      <a:endParaRPr/>
+                      <a:endParaRPr sz="500"/>
                     </a:p>
                   </a:txBody>
                   <a:tcPr/>
@@ -8777,7 +9427,7 @@
                       <a:pPr>
                         <a:defRPr/>
                       </a:pPr>
-                      <a:endParaRPr/>
+                      <a:endParaRPr sz="500"/>
                     </a:p>
                   </a:txBody>
                   <a:tcPr/>
@@ -8787,16 +9437,127 @@
           </a:graphicData>
         </a:graphic>
       </p:graphicFrame>
-      <p:sp>
-        <p:nvSpPr>
-          <p:cNvPr id="517144460" name=""/>
+      <p:graphicFrame>
+        <p:nvGraphicFramePr>
+          <p:cNvPr id="1454304437" name=""/>
+          <p:cNvGraphicFramePr>
+            <a:graphicFrameLocks xmlns:a="http://schemas.openxmlformats.org/drawingml/2006/main"/>
+          </p:cNvGraphicFramePr>
+          <p:nvPr/>
+        </p:nvGraphicFramePr>
+        <p:xfrm rot="0">
+          <a:off x="4708537" y="4496212"/>
+          <a:ext cx="2393680" cy="378459"/>
+        </p:xfrm>
+        <a:graphic>
+          <a:graphicData uri="http://schemas.openxmlformats.org/drawingml/2006/table">
+            <a:tbl>
+              <a:tblPr firstRow="1" firstCol="0" lastRow="0" lastCol="0" bandRow="1" bandCol="0">
+                <a:tableStyleId>{5940675A-B579-460E-94D1-54222C63F5DA}</a:tableStyleId>
+              </a:tblPr>
+              <a:tblGrid>
+                <a:gridCol w="221081"/>
+                <a:gridCol w="221081"/>
+                <a:gridCol w="221081"/>
+                <a:gridCol w="221081"/>
+                <a:gridCol w="221081"/>
+              </a:tblGrid>
+              <a:tr h="266140">
+                <a:tc>
+                  <a:txBody>
+                    <a:bodyPr/>
+                    <a:p>
+                      <a:pPr>
+                        <a:defRPr/>
+                      </a:pPr>
+                      <a:endParaRPr sz="500"/>
+                    </a:p>
+                  </a:txBody>
+                  <a:tcPr>
+                    <a:solidFill>
+                      <a:schemeClr val="accent6"/>
+                    </a:solidFill>
+                  </a:tcPr>
+                </a:tc>
+                <a:tc>
+                  <a:txBody>
+                    <a:bodyPr/>
+                    <a:p>
+                      <a:pPr>
+                        <a:defRPr/>
+                      </a:pPr>
+                      <a:endParaRPr sz="500"/>
+                    </a:p>
+                  </a:txBody>
+                  <a:tcPr>
+                    <a:solidFill>
+                      <a:schemeClr val="accent6"/>
+                    </a:solidFill>
+                  </a:tcPr>
+                </a:tc>
+                <a:tc>
+                  <a:txBody>
+                    <a:bodyPr/>
+                    <a:p>
+                      <a:pPr>
+                        <a:defRPr/>
+                      </a:pPr>
+                      <a:endParaRPr sz="500"/>
+                    </a:p>
+                  </a:txBody>
+                  <a:tcPr>
+                    <a:solidFill>
+                      <a:schemeClr val="accent6"/>
+                    </a:solidFill>
+                  </a:tcPr>
+                </a:tc>
+                <a:tc>
+                  <a:txBody>
+                    <a:bodyPr/>
+                    <a:p>
+                      <a:pPr>
+                        <a:defRPr/>
+                      </a:pPr>
+                      <a:endParaRPr sz="500"/>
+                    </a:p>
+                  </a:txBody>
+                  <a:tcPr>
+                    <a:solidFill>
+                      <a:schemeClr val="accent6"/>
+                    </a:solidFill>
+                  </a:tcPr>
+                </a:tc>
+                <a:tc>
+                  <a:txBody>
+                    <a:bodyPr/>
+                    <a:p>
+                      <a:pPr>
+                        <a:defRPr/>
+                      </a:pPr>
+                      <a:endParaRPr sz="500"/>
+                    </a:p>
+                  </a:txBody>
+                  <a:tcPr>
+                    <a:solidFill>
+                      <a:schemeClr val="accent6"/>
+                    </a:solidFill>
+                  </a:tcPr>
+                </a:tc>
+              </a:tr>
+            </a:tbl>
+          </a:graphicData>
+        </a:graphic>
+      </p:graphicFrame>
+      <p:sp>
+        <p:nvSpPr>
+          <p:cNvPr id="752751763" name=""/>
           <p:cNvSpPr/>
           <p:nvPr/>
         </p:nvSpPr>
         <p:spPr bwMode="auto">
           <a:xfrm rot="0" flipH="0" flipV="0">
-            <a:off x="806181" y="4398818"/>
-            <a:ext cx="2138795" cy="666749"/>
+            <a:off x="4599742" y="4359591"/>
+            <a:ext cx="1121352" cy="525664"/>
           </a:xfrm>
           <a:prstGeom prst="rect">
             <a:avLst/>
@@ -8831,16 +9592,109 @@
           </a:fontRef>
         </p:style>
       </p:sp>
-      <p:sp>
-        <p:nvSpPr>
-          <p:cNvPr id="469402008" name=""/>
+      <p:graphicFrame>
+        <p:nvGraphicFramePr>
+          <p:cNvPr id="345595044" name=""/>
+          <p:cNvGraphicFramePr>
+            <a:graphicFrameLocks xmlns:a="http://schemas.openxmlformats.org/drawingml/2006/main"/>
+          </p:cNvGraphicFramePr>
+          <p:nvPr/>
+        </p:nvGraphicFramePr>
+        <p:xfrm rot="0">
+          <a:off x="5819787" y="4496212"/>
+          <a:ext cx="2393680" cy="378459"/>
+        </p:xfrm>
+        <a:graphic>
+          <a:graphicData uri="http://schemas.openxmlformats.org/drawingml/2006/table">
+            <a:tbl>
+              <a:tblPr firstRow="1" firstCol="0" lastRow="0" lastCol="0" bandRow="1" bandCol="0">
+                <a:tableStyleId>{5940675A-B579-460E-94D1-54222C63F5DA}</a:tableStyleId>
+              </a:tblPr>
+              <a:tblGrid>
+                <a:gridCol w="221081"/>
+                <a:gridCol w="221081"/>
+                <a:gridCol w="221081"/>
+                <a:gridCol w="221081"/>
+                <a:gridCol w="221081"/>
+              </a:tblGrid>
+              <a:tr h="266140">
+                <a:tc>
+                  <a:txBody>
+                    <a:bodyPr/>
+                    <a:p>
+                      <a:pPr>
+                        <a:defRPr/>
+                      </a:pPr>
+                      <a:endParaRPr sz="500"/>
+                    </a:p>
+                  </a:txBody>
+                  <a:tcPr>
+                    <a:noFill/>
+                  </a:tcPr>
+                </a:tc>
+                <a:tc>
+                  <a:txBody>
+                    <a:bodyPr/>
+                    <a:p>
+                      <a:pPr>
+                        <a:defRPr/>
+                      </a:pPr>
+                      <a:endParaRPr sz="500"/>
+                    </a:p>
+                  </a:txBody>
+                  <a:tcPr/>
+                </a:tc>
+                <a:tc>
+                  <a:txBody>
+                    <a:bodyPr/>
+                    <a:p>
+                      <a:pPr>
+                        <a:defRPr/>
+                      </a:pPr>
+                      <a:endParaRPr sz="500"/>
+                    </a:p>
+                  </a:txBody>
+                  <a:tcPr/>
+                </a:tc>
+                <a:tc>
+                  <a:txBody>
+                    <a:bodyPr/>
+                    <a:p>
+                      <a:pPr>
+                        <a:defRPr/>
+                      </a:pPr>
+                      <a:endParaRPr sz="500"/>
+                    </a:p>
+                  </a:txBody>
+                  <a:tcPr/>
+                </a:tc>
+                <a:tc>
+                  <a:txBody>
+                    <a:bodyPr/>
+                    <a:p>
+                      <a:pPr>
+                        <a:defRPr/>
+                      </a:pPr>
+                      <a:endParaRPr sz="500"/>
+                    </a:p>
+                  </a:txBody>
+                  <a:tcPr/>
+                </a:tc>
+              </a:tr>
+            </a:tbl>
+          </a:graphicData>
+        </a:graphic>
+      </p:graphicFrame>
+      <p:sp>
+        <p:nvSpPr>
+          <p:cNvPr id="1893005861" name=""/>
           <p:cNvSpPr txBox="1"/>
           <p:nvPr/>
         </p:nvSpPr>
         <p:spPr bwMode="auto">
           <a:xfrm rot="0" flipH="0" flipV="0">
-            <a:off x="903971" y="5153363"/>
-            <a:ext cx="2047125" cy="274679"/>
+            <a:off x="4597758" y="5016023"/>
+            <a:ext cx="1122975" cy="274679"/>
           </a:xfrm>
           <a:prstGeom prst="rect">
             <a:avLst/>
@@ -8870,45 +9724,50 @@
           </a:p>
         </p:txBody>
       </p:sp>
-      <p:sp>
-        <p:nvSpPr>
-          <p:cNvPr id="1391847854" name=""/>
-          <p:cNvSpPr txBox="1"/>
-          <p:nvPr/>
-        </p:nvSpPr>
-        <p:spPr bwMode="auto">
-          <a:xfrm rot="0" flipH="0" flipV="0">
-            <a:off x="1083575" y="1897545"/>
-            <a:ext cx="2056485" cy="274679"/>
+      <p:pic>
+        <p:nvPicPr>
+          <p:cNvPr id="1193804755" name=""/>
+          <p:cNvPicPr>
+            <a:picLocks noChangeAspect="1"/>
+          </p:cNvPicPr>
+          <p:nvPr/>
+        </p:nvPicPr>
+        <p:blipFill rotWithShape="1">
+          <a:blip r:embed="rId3"/>
+          <a:stretch/>
+        </p:blipFill>
+        <p:spPr bwMode="auto">
+          <a:xfrm flipH="0" flipV="0">
+            <a:off x="5503658" y="1408224"/>
+            <a:ext cx="442433" cy="424167"/>
           </a:xfrm>
           <a:prstGeom prst="rect">
             <a:avLst/>
           </a:prstGeom>
-          <a:noFill/>
-        </p:spPr>
-        <p:txBody>
-          <a:bodyPr vertOverflow="overflow" horzOverflow="overflow" vert="horz" wrap="square" lIns="91440" tIns="45720" rIns="91440" bIns="45720" numCol="1" spcCol="0" rtlCol="0" fromWordArt="0" anchor="t" anchorCtr="0" forceAA="0" upright="0" compatLnSpc="0">
-            <a:spAutoFit/>
-          </a:bodyPr>
-          <a:p>
-            <a:pPr algn="ctr">
-              <a:defRPr/>
-            </a:pPr>
-            <a:r>
-              <a:rPr sz="1200">
-                <a:latin typeface="Open Sans"/>
-                <a:ea typeface="Open Sans"/>
-                <a:cs typeface="Open Sans"/>
-              </a:rPr>
-              <a:t>B matrix is not transposed</a:t>
-            </a:r>
-            <a:endParaRPr sz="1200">
-              <a:latin typeface="Open Sans"/>
-              <a:cs typeface="Open Sans"/>
-            </a:endParaRPr>
-          </a:p>
-        </p:txBody>
-      </p:sp>
+        </p:spPr>
+      </p:pic>
+      <p:pic>
+        <p:nvPicPr>
+          <p:cNvPr id="1709948806" name=""/>
+          <p:cNvPicPr>
+            <a:picLocks noChangeAspect="1"/>
+          </p:cNvPicPr>
+          <p:nvPr/>
+        </p:nvPicPr>
+        <p:blipFill rotWithShape="1">
+          <a:blip r:embed="rId4"/>
+          <a:stretch/>
+        </p:blipFill>
+        <p:spPr bwMode="auto">
+          <a:xfrm flipH="0" flipV="0">
+            <a:off x="1938351" y="1408224"/>
+            <a:ext cx="411663" cy="424167"/>
+          </a:xfrm>
+          <a:prstGeom prst="rect">
+            <a:avLst/>
+          </a:prstGeom>
+        </p:spPr>
+      </p:pic>
     </p:spTree>
   </p:cSld>
   <p:clrMapOvr>

</xml_diff>